<commit_message>
Update and finalise presentation
</commit_message>
<xml_diff>
--- a/Project Documentation/Demos/Demo 04/Demo 04.pptx
+++ b/Project Documentation/Demos/Demo 04/Demo 04.pptx
@@ -1399,29 +1399,29 @@
     </dgm:pt>
   </dgm:ptLst>
   <dgm:cxnLst>
+    <dgm:cxn modelId="{4989005C-CB44-49EC-975B-2B2279E552B8}" type="presOf" srcId="{A45D5F63-C5E3-47F8-AB0E-319C4686FB99}" destId="{AB83B138-2A57-4F41-985D-0DF9933E58FD}" srcOrd="1" destOrd="0" presId="urn:microsoft.com/office/officeart/2005/8/layout/process2"/>
+    <dgm:cxn modelId="{49D14A0F-B6A3-459B-B28F-067D9AA97FDF}" type="presOf" srcId="{2D947E25-C16B-42FD-80F9-097235D840FE}" destId="{E4E9F33E-FEB6-4B1D-B1CA-32DE732DD70F}" srcOrd="1" destOrd="0" presId="urn:microsoft.com/office/officeart/2005/8/layout/process2"/>
+    <dgm:cxn modelId="{381102F7-F453-4056-81B4-71D4D677C020}" type="presOf" srcId="{AAD92323-C489-44B1-AC4F-BF3E44649CD1}" destId="{77250FC4-3CD4-4BD3-83CF-DF8D02B9DCB1}" srcOrd="0" destOrd="0" presId="urn:microsoft.com/office/officeart/2005/8/layout/process2"/>
+    <dgm:cxn modelId="{0E2BDD81-F05F-4A62-87A3-1354F4E5428E}" type="presOf" srcId="{D729FD14-48D0-4CC4-9926-F3919B7E762C}" destId="{AD0CCC23-1F57-49C7-B76F-B4723BE73D69}" srcOrd="0" destOrd="0" presId="urn:microsoft.com/office/officeart/2005/8/layout/process2"/>
+    <dgm:cxn modelId="{E8E79792-F14B-4744-80AE-834963824FC8}" srcId="{CBE68F96-89C8-4389-B3B0-A60C07AFA6E6}" destId="{F47371DB-8BEA-432B-ADA0-92D74E0702F9}" srcOrd="5" destOrd="0" parTransId="{9A8F9194-ED8A-4073-8172-A824663106CD}" sibTransId="{B57E6720-3994-43C0-84D2-502851A5528A}"/>
+    <dgm:cxn modelId="{7694E1A8-E481-4D2E-88B3-8B94C402C8F9}" type="presOf" srcId="{1E9179C2-916E-4A3B-A3CF-DF8E80578314}" destId="{0FA3274E-7887-46B3-8442-535265B3BE97}" srcOrd="0" destOrd="0" presId="urn:microsoft.com/office/officeart/2005/8/layout/process2"/>
+    <dgm:cxn modelId="{0E41B929-8ACC-41AA-830F-20A38A60FC9A}" type="presOf" srcId="{2820C90F-A052-410A-8796-E35727C61AB1}" destId="{AAD76F6B-85DD-4996-A1DA-7B3AC0892BDF}" srcOrd="0" destOrd="0" presId="urn:microsoft.com/office/officeart/2005/8/layout/process2"/>
+    <dgm:cxn modelId="{3D8B1B7C-91AF-49D2-B70D-23E1A7D3B1E5}" srcId="{CBE68F96-89C8-4389-B3B0-A60C07AFA6E6}" destId="{2820C90F-A052-410A-8796-E35727C61AB1}" srcOrd="2" destOrd="0" parTransId="{78E55CB7-15F5-423B-94D1-79A160D30E0A}" sibTransId="{2D947E25-C16B-42FD-80F9-097235D840FE}"/>
+    <dgm:cxn modelId="{BE409258-F436-4219-B2CB-4F2DC72D0CB5}" type="presOf" srcId="{F47371DB-8BEA-432B-ADA0-92D74E0702F9}" destId="{B0AFBA69-F6EE-4B41-94B1-52466432E21A}" srcOrd="0" destOrd="0" presId="urn:microsoft.com/office/officeart/2005/8/layout/process2"/>
+    <dgm:cxn modelId="{0C603DD4-5EE6-448F-9789-0C8238C21B27}" type="presOf" srcId="{8B974063-B1DE-4251-8A63-72D8186D41BF}" destId="{9825CFF7-6447-4F43-8805-529CAD78ED53}" srcOrd="1" destOrd="0" presId="urn:microsoft.com/office/officeart/2005/8/layout/process2"/>
+    <dgm:cxn modelId="{7E4616DD-6D95-4577-B40F-2EBA20D667BF}" type="presOf" srcId="{1A75F6BB-B0E0-4EE8-9800-137D7E40F05F}" destId="{2AA5EB6B-6F84-481E-A18B-83054F65A1F2}" srcOrd="0" destOrd="0" presId="urn:microsoft.com/office/officeart/2005/8/layout/process2"/>
+    <dgm:cxn modelId="{9B7FBDE7-BF59-419F-9F08-D3A4681B438B}" srcId="{CBE68F96-89C8-4389-B3B0-A60C07AFA6E6}" destId="{AAD92323-C489-44B1-AC4F-BF3E44649CD1}" srcOrd="0" destOrd="0" parTransId="{6156862B-919D-4843-98F8-675367551794}" sibTransId="{1E9179C2-916E-4A3B-A3CF-DF8E80578314}"/>
+    <dgm:cxn modelId="{E7C238FE-D3E5-477A-A084-4B69CB609D3F}" type="presOf" srcId="{C1A2ECBC-96F4-49E9-89CE-643A37EAFA9B}" destId="{732916D8-68AD-487E-AEC1-35EF61FAD896}" srcOrd="0" destOrd="0" presId="urn:microsoft.com/office/officeart/2005/8/layout/process2"/>
+    <dgm:cxn modelId="{87527954-69AA-4C26-8DC2-0CA36D5FE8EA}" srcId="{CBE68F96-89C8-4389-B3B0-A60C07AFA6E6}" destId="{B6B66AB5-6C31-4B5F-93E1-8F76E49BB650}" srcOrd="1" destOrd="0" parTransId="{1D8308EB-D457-4B19-9144-B6BDC74BBD90}" sibTransId="{A45D5F63-C5E3-47F8-AB0E-319C4686FB99}"/>
+    <dgm:cxn modelId="{9AA78EF5-1F28-4444-9026-FFEE15325185}" type="presOf" srcId="{1E9179C2-916E-4A3B-A3CF-DF8E80578314}" destId="{27D75239-A8E8-4AD8-B82C-B2A103CDCEB6}" srcOrd="1" destOrd="0" presId="urn:microsoft.com/office/officeart/2005/8/layout/process2"/>
     <dgm:cxn modelId="{3C83514D-0E2D-4F02-BDC1-94D74577E91D}" srcId="{CBE68F96-89C8-4389-B3B0-A60C07AFA6E6}" destId="{C1A2ECBC-96F4-49E9-89CE-643A37EAFA9B}" srcOrd="3" destOrd="0" parTransId="{525DE2EB-6B3A-4213-8E65-36CD43ABA2F6}" sibTransId="{8B974063-B1DE-4251-8A63-72D8186D41BF}"/>
+    <dgm:cxn modelId="{D082DA6C-6C77-467F-B0E8-090BFE29843B}" srcId="{CBE68F96-89C8-4389-B3B0-A60C07AFA6E6}" destId="{1A75F6BB-B0E0-4EE8-9800-137D7E40F05F}" srcOrd="4" destOrd="0" parTransId="{3B3E3129-D855-45EB-8516-A4A49E647C63}" sibTransId="{D729FD14-48D0-4CC4-9926-F3919B7E762C}"/>
+    <dgm:cxn modelId="{D33664B6-E3E0-476E-9F08-B40E0B20849E}" type="presOf" srcId="{B6B66AB5-6C31-4B5F-93E1-8F76E49BB650}" destId="{FB21C287-DDB9-4E6E-8134-F3A4E6900117}" srcOrd="0" destOrd="0" presId="urn:microsoft.com/office/officeart/2005/8/layout/process2"/>
+    <dgm:cxn modelId="{22549A3E-B650-40C6-9B18-FE78A4149DEF}" type="presOf" srcId="{A45D5F63-C5E3-47F8-AB0E-319C4686FB99}" destId="{CD4CD681-E631-4A2A-8903-86E13A46DBBC}" srcOrd="0" destOrd="0" presId="urn:microsoft.com/office/officeart/2005/8/layout/process2"/>
+    <dgm:cxn modelId="{2C5713E7-94E1-42C8-AAB7-B7085F0C7128}" type="presOf" srcId="{8B974063-B1DE-4251-8A63-72D8186D41BF}" destId="{2354E252-F4A1-4619-87D5-32227FCB99F2}" srcOrd="0" destOrd="0" presId="urn:microsoft.com/office/officeart/2005/8/layout/process2"/>
     <dgm:cxn modelId="{7CC6CE63-CB22-400E-8D48-0FD09633AED2}" type="presOf" srcId="{CBE68F96-89C8-4389-B3B0-A60C07AFA6E6}" destId="{BBD1517F-8595-43FF-B8A2-BFDF5EABC173}" srcOrd="0" destOrd="0" presId="urn:microsoft.com/office/officeart/2005/8/layout/process2"/>
-    <dgm:cxn modelId="{0E2BDD81-F05F-4A62-87A3-1354F4E5428E}" type="presOf" srcId="{D729FD14-48D0-4CC4-9926-F3919B7E762C}" destId="{AD0CCC23-1F57-49C7-B76F-B4723BE73D69}" srcOrd="0" destOrd="0" presId="urn:microsoft.com/office/officeart/2005/8/layout/process2"/>
     <dgm:cxn modelId="{DFE1707D-A897-4220-A3A1-CD68A2092A65}" type="presOf" srcId="{2D947E25-C16B-42FD-80F9-097235D840FE}" destId="{6BA4E6BB-2803-441C-AFDF-3F1A3E073117}" srcOrd="0" destOrd="0" presId="urn:microsoft.com/office/officeart/2005/8/layout/process2"/>
-    <dgm:cxn modelId="{7E4616DD-6D95-4577-B40F-2EBA20D667BF}" type="presOf" srcId="{1A75F6BB-B0E0-4EE8-9800-137D7E40F05F}" destId="{2AA5EB6B-6F84-481E-A18B-83054F65A1F2}" srcOrd="0" destOrd="0" presId="urn:microsoft.com/office/officeart/2005/8/layout/process2"/>
-    <dgm:cxn modelId="{3D8B1B7C-91AF-49D2-B70D-23E1A7D3B1E5}" srcId="{CBE68F96-89C8-4389-B3B0-A60C07AFA6E6}" destId="{2820C90F-A052-410A-8796-E35727C61AB1}" srcOrd="2" destOrd="0" parTransId="{78E55CB7-15F5-423B-94D1-79A160D30E0A}" sibTransId="{2D947E25-C16B-42FD-80F9-097235D840FE}"/>
-    <dgm:cxn modelId="{7694E1A8-E481-4D2E-88B3-8B94C402C8F9}" type="presOf" srcId="{1E9179C2-916E-4A3B-A3CF-DF8E80578314}" destId="{0FA3274E-7887-46B3-8442-535265B3BE97}" srcOrd="0" destOrd="0" presId="urn:microsoft.com/office/officeart/2005/8/layout/process2"/>
     <dgm:cxn modelId="{CF0614B2-66E2-40D6-9541-A622F7781212}" type="presOf" srcId="{D729FD14-48D0-4CC4-9926-F3919B7E762C}" destId="{C6F8793C-44C2-4F66-9B04-8FD07C3AE97D}" srcOrd="1" destOrd="0" presId="urn:microsoft.com/office/officeart/2005/8/layout/process2"/>
-    <dgm:cxn modelId="{4989005C-CB44-49EC-975B-2B2279E552B8}" type="presOf" srcId="{A45D5F63-C5E3-47F8-AB0E-319C4686FB99}" destId="{AB83B138-2A57-4F41-985D-0DF9933E58FD}" srcOrd="1" destOrd="0" presId="urn:microsoft.com/office/officeart/2005/8/layout/process2"/>
-    <dgm:cxn modelId="{D33664B6-E3E0-476E-9F08-B40E0B20849E}" type="presOf" srcId="{B6B66AB5-6C31-4B5F-93E1-8F76E49BB650}" destId="{FB21C287-DDB9-4E6E-8134-F3A4E6900117}" srcOrd="0" destOrd="0" presId="urn:microsoft.com/office/officeart/2005/8/layout/process2"/>
-    <dgm:cxn modelId="{E7C238FE-D3E5-477A-A084-4B69CB609D3F}" type="presOf" srcId="{C1A2ECBC-96F4-49E9-89CE-643A37EAFA9B}" destId="{732916D8-68AD-487E-AEC1-35EF61FAD896}" srcOrd="0" destOrd="0" presId="urn:microsoft.com/office/officeart/2005/8/layout/process2"/>
-    <dgm:cxn modelId="{2C5713E7-94E1-42C8-AAB7-B7085F0C7128}" type="presOf" srcId="{8B974063-B1DE-4251-8A63-72D8186D41BF}" destId="{2354E252-F4A1-4619-87D5-32227FCB99F2}" srcOrd="0" destOrd="0" presId="urn:microsoft.com/office/officeart/2005/8/layout/process2"/>
-    <dgm:cxn modelId="{9B7FBDE7-BF59-419F-9F08-D3A4681B438B}" srcId="{CBE68F96-89C8-4389-B3B0-A60C07AFA6E6}" destId="{AAD92323-C489-44B1-AC4F-BF3E44649CD1}" srcOrd="0" destOrd="0" parTransId="{6156862B-919D-4843-98F8-675367551794}" sibTransId="{1E9179C2-916E-4A3B-A3CF-DF8E80578314}"/>
-    <dgm:cxn modelId="{E8E79792-F14B-4744-80AE-834963824FC8}" srcId="{CBE68F96-89C8-4389-B3B0-A60C07AFA6E6}" destId="{F47371DB-8BEA-432B-ADA0-92D74E0702F9}" srcOrd="5" destOrd="0" parTransId="{9A8F9194-ED8A-4073-8172-A824663106CD}" sibTransId="{B57E6720-3994-43C0-84D2-502851A5528A}"/>
-    <dgm:cxn modelId="{49D14A0F-B6A3-459B-B28F-067D9AA97FDF}" type="presOf" srcId="{2D947E25-C16B-42FD-80F9-097235D840FE}" destId="{E4E9F33E-FEB6-4B1D-B1CA-32DE732DD70F}" srcOrd="1" destOrd="0" presId="urn:microsoft.com/office/officeart/2005/8/layout/process2"/>
-    <dgm:cxn modelId="{22549A3E-B650-40C6-9B18-FE78A4149DEF}" type="presOf" srcId="{A45D5F63-C5E3-47F8-AB0E-319C4686FB99}" destId="{CD4CD681-E631-4A2A-8903-86E13A46DBBC}" srcOrd="0" destOrd="0" presId="urn:microsoft.com/office/officeart/2005/8/layout/process2"/>
-    <dgm:cxn modelId="{D082DA6C-6C77-467F-B0E8-090BFE29843B}" srcId="{CBE68F96-89C8-4389-B3B0-A60C07AFA6E6}" destId="{1A75F6BB-B0E0-4EE8-9800-137D7E40F05F}" srcOrd="4" destOrd="0" parTransId="{3B3E3129-D855-45EB-8516-A4A49E647C63}" sibTransId="{D729FD14-48D0-4CC4-9926-F3919B7E762C}"/>
-    <dgm:cxn modelId="{0E41B929-8ACC-41AA-830F-20A38A60FC9A}" type="presOf" srcId="{2820C90F-A052-410A-8796-E35727C61AB1}" destId="{AAD76F6B-85DD-4996-A1DA-7B3AC0892BDF}" srcOrd="0" destOrd="0" presId="urn:microsoft.com/office/officeart/2005/8/layout/process2"/>
-    <dgm:cxn modelId="{0C603DD4-5EE6-448F-9789-0C8238C21B27}" type="presOf" srcId="{8B974063-B1DE-4251-8A63-72D8186D41BF}" destId="{9825CFF7-6447-4F43-8805-529CAD78ED53}" srcOrd="1" destOrd="0" presId="urn:microsoft.com/office/officeart/2005/8/layout/process2"/>
-    <dgm:cxn modelId="{381102F7-F453-4056-81B4-71D4D677C020}" type="presOf" srcId="{AAD92323-C489-44B1-AC4F-BF3E44649CD1}" destId="{77250FC4-3CD4-4BD3-83CF-DF8D02B9DCB1}" srcOrd="0" destOrd="0" presId="urn:microsoft.com/office/officeart/2005/8/layout/process2"/>
-    <dgm:cxn modelId="{87527954-69AA-4C26-8DC2-0CA36D5FE8EA}" srcId="{CBE68F96-89C8-4389-B3B0-A60C07AFA6E6}" destId="{B6B66AB5-6C31-4B5F-93E1-8F76E49BB650}" srcOrd="1" destOrd="0" parTransId="{1D8308EB-D457-4B19-9144-B6BDC74BBD90}" sibTransId="{A45D5F63-C5E3-47F8-AB0E-319C4686FB99}"/>
-    <dgm:cxn modelId="{BE409258-F436-4219-B2CB-4F2DC72D0CB5}" type="presOf" srcId="{F47371DB-8BEA-432B-ADA0-92D74E0702F9}" destId="{B0AFBA69-F6EE-4B41-94B1-52466432E21A}" srcOrd="0" destOrd="0" presId="urn:microsoft.com/office/officeart/2005/8/layout/process2"/>
-    <dgm:cxn modelId="{9AA78EF5-1F28-4444-9026-FFEE15325185}" type="presOf" srcId="{1E9179C2-916E-4A3B-A3CF-DF8E80578314}" destId="{27D75239-A8E8-4AD8-B82C-B2A103CDCEB6}" srcOrd="1" destOrd="0" presId="urn:microsoft.com/office/officeart/2005/8/layout/process2"/>
     <dgm:cxn modelId="{B5B009FD-CE3D-4307-A549-62DF9BCD020C}" type="presParOf" srcId="{BBD1517F-8595-43FF-B8A2-BFDF5EABC173}" destId="{77250FC4-3CD4-4BD3-83CF-DF8D02B9DCB1}" srcOrd="0" destOrd="0" presId="urn:microsoft.com/office/officeart/2005/8/layout/process2"/>
     <dgm:cxn modelId="{283B8100-B0F3-4F83-AA16-A267A83977DC}" type="presParOf" srcId="{BBD1517F-8595-43FF-B8A2-BFDF5EABC173}" destId="{0FA3274E-7887-46B3-8442-535265B3BE97}" srcOrd="1" destOrd="0" presId="urn:microsoft.com/office/officeart/2005/8/layout/process2"/>
     <dgm:cxn modelId="{D6D884EC-7D61-4D46-BE01-BE2BEBC3C2AD}" type="presParOf" srcId="{0FA3274E-7887-46B3-8442-535265B3BE97}" destId="{27D75239-A8E8-4AD8-B82C-B2A103CDCEB6}" srcOrd="0" destOrd="0" presId="urn:microsoft.com/office/officeart/2005/8/layout/process2"/>
@@ -1457,830 +1457,6 @@
       <dsp:cNvGrpSpPr/>
     </dsp:nvGrpSpPr>
     <dsp:grpSpPr/>
-    <dsp:sp modelId="{77250FC4-3CD4-4BD3-83CF-DF8D02B9DCB1}">
-      <dsp:nvSpPr>
-        <dsp:cNvPr id="0" name=""/>
-        <dsp:cNvSpPr/>
-      </dsp:nvSpPr>
-      <dsp:spPr>
-        <a:xfrm>
-          <a:off x="107990" y="16023"/>
-          <a:ext cx="1932565" cy="492667"/>
-        </a:xfrm>
-        <a:prstGeom prst="roundRect">
-          <a:avLst>
-            <a:gd name="adj" fmla="val 10000"/>
-          </a:avLst>
-        </a:prstGeom>
-        <a:solidFill>
-          <a:schemeClr val="accent1">
-            <a:hueOff val="0"/>
-            <a:satOff val="0"/>
-            <a:lumOff val="0"/>
-            <a:alphaOff val="0"/>
-          </a:schemeClr>
-        </a:solidFill>
-        <a:ln w="12700" cap="flat" cmpd="sng" algn="ctr">
-          <a:solidFill>
-            <a:schemeClr val="lt1">
-              <a:hueOff val="0"/>
-              <a:satOff val="0"/>
-              <a:lumOff val="0"/>
-              <a:alphaOff val="0"/>
-            </a:schemeClr>
-          </a:solidFill>
-          <a:prstDash val="solid"/>
-          <a:miter lim="800000"/>
-        </a:ln>
-        <a:effectLst/>
-      </dsp:spPr>
-      <dsp:style>
-        <a:lnRef idx="2">
-          <a:scrgbClr r="0" g="0" b="0"/>
-        </a:lnRef>
-        <a:fillRef idx="1">
-          <a:scrgbClr r="0" g="0" b="0"/>
-        </a:fillRef>
-        <a:effectRef idx="0">
-          <a:scrgbClr r="0" g="0" b="0"/>
-        </a:effectRef>
-        <a:fontRef idx="minor">
-          <a:schemeClr val="lt1"/>
-        </a:fontRef>
-      </dsp:style>
-      <dsp:txBody>
-        <a:bodyPr spcFirstLastPara="0" vert="horz" wrap="square" lIns="57150" tIns="57150" rIns="57150" bIns="57150" numCol="1" spcCol="1270" anchor="ctr" anchorCtr="0">
-          <a:noAutofit/>
-        </a:bodyPr>
-        <a:lstStyle/>
-        <a:p>
-          <a:pPr lvl="0" algn="ctr" defTabSz="666750">
-            <a:lnSpc>
-              <a:spcPct val="90000"/>
-            </a:lnSpc>
-            <a:spcBef>
-              <a:spcPct val="0"/>
-            </a:spcBef>
-            <a:spcAft>
-              <a:spcPct val="35000"/>
-            </a:spcAft>
-          </a:pPr>
-          <a:r>
-            <a:rPr lang="en-ZA" sz="1500" kern="1200" dirty="0" smtClean="0"/>
-            <a:t>SRS</a:t>
-          </a:r>
-          <a:endParaRPr lang="en-ZA" sz="1500" kern="1200" dirty="0"/>
-        </a:p>
-      </dsp:txBody>
-      <dsp:txXfrm>
-        <a:off x="122420" y="30453"/>
-        <a:ext cx="1903705" cy="463807"/>
-      </dsp:txXfrm>
-    </dsp:sp>
-    <dsp:sp modelId="{0FA3274E-7887-46B3-8442-535265B3BE97}">
-      <dsp:nvSpPr>
-        <dsp:cNvPr id="0" name=""/>
-        <dsp:cNvSpPr/>
-      </dsp:nvSpPr>
-      <dsp:spPr>
-        <a:xfrm rot="5400000">
-          <a:off x="981898" y="521008"/>
-          <a:ext cx="184750" cy="221700"/>
-        </a:xfrm>
-        <a:prstGeom prst="rightArrow">
-          <a:avLst>
-            <a:gd name="adj1" fmla="val 60000"/>
-            <a:gd name="adj2" fmla="val 50000"/>
-          </a:avLst>
-        </a:prstGeom>
-        <a:solidFill>
-          <a:schemeClr val="accent1">
-            <a:tint val="60000"/>
-            <a:hueOff val="0"/>
-            <a:satOff val="0"/>
-            <a:lumOff val="0"/>
-            <a:alphaOff val="0"/>
-          </a:schemeClr>
-        </a:solidFill>
-        <a:ln>
-          <a:noFill/>
-        </a:ln>
-        <a:effectLst/>
-      </dsp:spPr>
-      <dsp:style>
-        <a:lnRef idx="0">
-          <a:scrgbClr r="0" g="0" b="0"/>
-        </a:lnRef>
-        <a:fillRef idx="1">
-          <a:scrgbClr r="0" g="0" b="0"/>
-        </a:fillRef>
-        <a:effectRef idx="0">
-          <a:scrgbClr r="0" g="0" b="0"/>
-        </a:effectRef>
-        <a:fontRef idx="minor">
-          <a:schemeClr val="lt1"/>
-        </a:fontRef>
-      </dsp:style>
-      <dsp:txBody>
-        <a:bodyPr spcFirstLastPara="0" vert="horz" wrap="square" lIns="0" tIns="0" rIns="0" bIns="0" numCol="1" spcCol="1270" anchor="ctr" anchorCtr="0">
-          <a:noAutofit/>
-        </a:bodyPr>
-        <a:lstStyle/>
-        <a:p>
-          <a:pPr lvl="0" algn="ctr" defTabSz="355600">
-            <a:lnSpc>
-              <a:spcPct val="90000"/>
-            </a:lnSpc>
-            <a:spcBef>
-              <a:spcPct val="0"/>
-            </a:spcBef>
-            <a:spcAft>
-              <a:spcPct val="35000"/>
-            </a:spcAft>
-          </a:pPr>
-          <a:endParaRPr lang="en-ZA" sz="800" kern="1200"/>
-        </a:p>
-      </dsp:txBody>
-      <dsp:txXfrm rot="-5400000">
-        <a:off x="1007764" y="539483"/>
-        <a:ext cx="133020" cy="129325"/>
-      </dsp:txXfrm>
-    </dsp:sp>
-    <dsp:sp modelId="{FB21C287-DDB9-4E6E-8134-F3A4E6900117}">
-      <dsp:nvSpPr>
-        <dsp:cNvPr id="0" name=""/>
-        <dsp:cNvSpPr/>
-      </dsp:nvSpPr>
-      <dsp:spPr>
-        <a:xfrm>
-          <a:off x="107990" y="755025"/>
-          <a:ext cx="1932565" cy="492667"/>
-        </a:xfrm>
-        <a:prstGeom prst="roundRect">
-          <a:avLst>
-            <a:gd name="adj" fmla="val 10000"/>
-          </a:avLst>
-        </a:prstGeom>
-        <a:solidFill>
-          <a:schemeClr val="accent1">
-            <a:hueOff val="0"/>
-            <a:satOff val="0"/>
-            <a:lumOff val="0"/>
-            <a:alphaOff val="0"/>
-          </a:schemeClr>
-        </a:solidFill>
-        <a:ln w="12700" cap="flat" cmpd="sng" algn="ctr">
-          <a:solidFill>
-            <a:schemeClr val="lt1">
-              <a:hueOff val="0"/>
-              <a:satOff val="0"/>
-              <a:lumOff val="0"/>
-              <a:alphaOff val="0"/>
-            </a:schemeClr>
-          </a:solidFill>
-          <a:prstDash val="solid"/>
-          <a:miter lim="800000"/>
-        </a:ln>
-        <a:effectLst/>
-      </dsp:spPr>
-      <dsp:style>
-        <a:lnRef idx="2">
-          <a:scrgbClr r="0" g="0" b="0"/>
-        </a:lnRef>
-        <a:fillRef idx="1">
-          <a:scrgbClr r="0" g="0" b="0"/>
-        </a:fillRef>
-        <a:effectRef idx="0">
-          <a:scrgbClr r="0" g="0" b="0"/>
-        </a:effectRef>
-        <a:fontRef idx="minor">
-          <a:schemeClr val="lt1"/>
-        </a:fontRef>
-      </dsp:style>
-      <dsp:txBody>
-        <a:bodyPr spcFirstLastPara="0" vert="horz" wrap="square" lIns="57150" tIns="57150" rIns="57150" bIns="57150" numCol="1" spcCol="1270" anchor="ctr" anchorCtr="0">
-          <a:noAutofit/>
-        </a:bodyPr>
-        <a:lstStyle/>
-        <a:p>
-          <a:pPr lvl="0" algn="ctr" defTabSz="666750">
-            <a:lnSpc>
-              <a:spcPct val="90000"/>
-            </a:lnSpc>
-            <a:spcBef>
-              <a:spcPct val="0"/>
-            </a:spcBef>
-            <a:spcAft>
-              <a:spcPct val="35000"/>
-            </a:spcAft>
-          </a:pPr>
-          <a:r>
-            <a:rPr lang="en-ZA" sz="1500" kern="1200" dirty="0" smtClean="0"/>
-            <a:t>PSAC</a:t>
-          </a:r>
-          <a:endParaRPr lang="en-ZA" sz="1500" kern="1200" dirty="0"/>
-        </a:p>
-      </dsp:txBody>
-      <dsp:txXfrm>
-        <a:off x="122420" y="769455"/>
-        <a:ext cx="1903705" cy="463807"/>
-      </dsp:txXfrm>
-    </dsp:sp>
-    <dsp:sp modelId="{CD4CD681-E631-4A2A-8903-86E13A46DBBC}">
-      <dsp:nvSpPr>
-        <dsp:cNvPr id="0" name=""/>
-        <dsp:cNvSpPr/>
-      </dsp:nvSpPr>
-      <dsp:spPr>
-        <a:xfrm rot="5400000">
-          <a:off x="981898" y="1260009"/>
-          <a:ext cx="184750" cy="221700"/>
-        </a:xfrm>
-        <a:prstGeom prst="rightArrow">
-          <a:avLst>
-            <a:gd name="adj1" fmla="val 60000"/>
-            <a:gd name="adj2" fmla="val 50000"/>
-          </a:avLst>
-        </a:prstGeom>
-        <a:solidFill>
-          <a:schemeClr val="accent1">
-            <a:tint val="60000"/>
-            <a:hueOff val="0"/>
-            <a:satOff val="0"/>
-            <a:lumOff val="0"/>
-            <a:alphaOff val="0"/>
-          </a:schemeClr>
-        </a:solidFill>
-        <a:ln>
-          <a:noFill/>
-        </a:ln>
-        <a:effectLst/>
-      </dsp:spPr>
-      <dsp:style>
-        <a:lnRef idx="0">
-          <a:scrgbClr r="0" g="0" b="0"/>
-        </a:lnRef>
-        <a:fillRef idx="1">
-          <a:scrgbClr r="0" g="0" b="0"/>
-        </a:fillRef>
-        <a:effectRef idx="0">
-          <a:scrgbClr r="0" g="0" b="0"/>
-        </a:effectRef>
-        <a:fontRef idx="minor">
-          <a:schemeClr val="lt1"/>
-        </a:fontRef>
-      </dsp:style>
-      <dsp:txBody>
-        <a:bodyPr spcFirstLastPara="0" vert="horz" wrap="square" lIns="0" tIns="0" rIns="0" bIns="0" numCol="1" spcCol="1270" anchor="ctr" anchorCtr="0">
-          <a:noAutofit/>
-        </a:bodyPr>
-        <a:lstStyle/>
-        <a:p>
-          <a:pPr lvl="0" algn="ctr" defTabSz="355600">
-            <a:lnSpc>
-              <a:spcPct val="90000"/>
-            </a:lnSpc>
-            <a:spcBef>
-              <a:spcPct val="0"/>
-            </a:spcBef>
-            <a:spcAft>
-              <a:spcPct val="35000"/>
-            </a:spcAft>
-          </a:pPr>
-          <a:endParaRPr lang="en-ZA" sz="800" kern="1200"/>
-        </a:p>
-      </dsp:txBody>
-      <dsp:txXfrm rot="-5400000">
-        <a:off x="1007764" y="1278484"/>
-        <a:ext cx="133020" cy="129325"/>
-      </dsp:txXfrm>
-    </dsp:sp>
-    <dsp:sp modelId="{AAD76F6B-85DD-4996-A1DA-7B3AC0892BDF}">
-      <dsp:nvSpPr>
-        <dsp:cNvPr id="0" name=""/>
-        <dsp:cNvSpPr/>
-      </dsp:nvSpPr>
-      <dsp:spPr>
-        <a:xfrm>
-          <a:off x="107990" y="1494026"/>
-          <a:ext cx="1932565" cy="492667"/>
-        </a:xfrm>
-        <a:prstGeom prst="roundRect">
-          <a:avLst>
-            <a:gd name="adj" fmla="val 10000"/>
-          </a:avLst>
-        </a:prstGeom>
-        <a:solidFill>
-          <a:schemeClr val="accent1">
-            <a:hueOff val="0"/>
-            <a:satOff val="0"/>
-            <a:lumOff val="0"/>
-            <a:alphaOff val="0"/>
-          </a:schemeClr>
-        </a:solidFill>
-        <a:ln w="12700" cap="flat" cmpd="sng" algn="ctr">
-          <a:solidFill>
-            <a:schemeClr val="lt1">
-              <a:hueOff val="0"/>
-              <a:satOff val="0"/>
-              <a:lumOff val="0"/>
-              <a:alphaOff val="0"/>
-            </a:schemeClr>
-          </a:solidFill>
-          <a:prstDash val="solid"/>
-          <a:miter lim="800000"/>
-        </a:ln>
-        <a:effectLst/>
-      </dsp:spPr>
-      <dsp:style>
-        <a:lnRef idx="2">
-          <a:scrgbClr r="0" g="0" b="0"/>
-        </a:lnRef>
-        <a:fillRef idx="1">
-          <a:scrgbClr r="0" g="0" b="0"/>
-        </a:fillRef>
-        <a:effectRef idx="0">
-          <a:scrgbClr r="0" g="0" b="0"/>
-        </a:effectRef>
-        <a:fontRef idx="minor">
-          <a:schemeClr val="lt1"/>
-        </a:fontRef>
-      </dsp:style>
-      <dsp:txBody>
-        <a:bodyPr spcFirstLastPara="0" vert="horz" wrap="square" lIns="57150" tIns="57150" rIns="57150" bIns="57150" numCol="1" spcCol="1270" anchor="ctr" anchorCtr="0">
-          <a:noAutofit/>
-        </a:bodyPr>
-        <a:lstStyle/>
-        <a:p>
-          <a:pPr lvl="0" algn="ctr" defTabSz="666750">
-            <a:lnSpc>
-              <a:spcPct val="90000"/>
-            </a:lnSpc>
-            <a:spcBef>
-              <a:spcPct val="0"/>
-            </a:spcBef>
-            <a:spcAft>
-              <a:spcPct val="35000"/>
-            </a:spcAft>
-          </a:pPr>
-          <a:r>
-            <a:rPr lang="en-ZA" sz="1500" kern="1200" dirty="0" smtClean="0"/>
-            <a:t>SDD</a:t>
-          </a:r>
-          <a:endParaRPr lang="en-ZA" sz="1500" kern="1200" dirty="0"/>
-        </a:p>
-      </dsp:txBody>
-      <dsp:txXfrm>
-        <a:off x="122420" y="1508456"/>
-        <a:ext cx="1903705" cy="463807"/>
-      </dsp:txXfrm>
-    </dsp:sp>
-    <dsp:sp modelId="{6BA4E6BB-2803-441C-AFDF-3F1A3E073117}">
-      <dsp:nvSpPr>
-        <dsp:cNvPr id="0" name=""/>
-        <dsp:cNvSpPr/>
-      </dsp:nvSpPr>
-      <dsp:spPr>
-        <a:xfrm rot="5400000">
-          <a:off x="981898" y="1999011"/>
-          <a:ext cx="184750" cy="221700"/>
-        </a:xfrm>
-        <a:prstGeom prst="rightArrow">
-          <a:avLst>
-            <a:gd name="adj1" fmla="val 60000"/>
-            <a:gd name="adj2" fmla="val 50000"/>
-          </a:avLst>
-        </a:prstGeom>
-        <a:solidFill>
-          <a:schemeClr val="accent1">
-            <a:tint val="60000"/>
-            <a:hueOff val="0"/>
-            <a:satOff val="0"/>
-            <a:lumOff val="0"/>
-            <a:alphaOff val="0"/>
-          </a:schemeClr>
-        </a:solidFill>
-        <a:ln>
-          <a:noFill/>
-        </a:ln>
-        <a:effectLst/>
-      </dsp:spPr>
-      <dsp:style>
-        <a:lnRef idx="0">
-          <a:scrgbClr r="0" g="0" b="0"/>
-        </a:lnRef>
-        <a:fillRef idx="1">
-          <a:scrgbClr r="0" g="0" b="0"/>
-        </a:fillRef>
-        <a:effectRef idx="0">
-          <a:scrgbClr r="0" g="0" b="0"/>
-        </a:effectRef>
-        <a:fontRef idx="minor">
-          <a:schemeClr val="lt1"/>
-        </a:fontRef>
-      </dsp:style>
-      <dsp:txBody>
-        <a:bodyPr spcFirstLastPara="0" vert="horz" wrap="square" lIns="0" tIns="0" rIns="0" bIns="0" numCol="1" spcCol="1270" anchor="ctr" anchorCtr="0">
-          <a:noAutofit/>
-        </a:bodyPr>
-        <a:lstStyle/>
-        <a:p>
-          <a:pPr lvl="0" algn="ctr" defTabSz="355600">
-            <a:lnSpc>
-              <a:spcPct val="90000"/>
-            </a:lnSpc>
-            <a:spcBef>
-              <a:spcPct val="0"/>
-            </a:spcBef>
-            <a:spcAft>
-              <a:spcPct val="35000"/>
-            </a:spcAft>
-          </a:pPr>
-          <a:endParaRPr lang="en-ZA" sz="800" kern="1200"/>
-        </a:p>
-      </dsp:txBody>
-      <dsp:txXfrm rot="-5400000">
-        <a:off x="1007764" y="2017486"/>
-        <a:ext cx="133020" cy="129325"/>
-      </dsp:txXfrm>
-    </dsp:sp>
-    <dsp:sp modelId="{732916D8-68AD-487E-AEC1-35EF61FAD896}">
-      <dsp:nvSpPr>
-        <dsp:cNvPr id="0" name=""/>
-        <dsp:cNvSpPr/>
-      </dsp:nvSpPr>
-      <dsp:spPr>
-        <a:xfrm>
-          <a:off x="107990" y="2233028"/>
-          <a:ext cx="1932565" cy="492667"/>
-        </a:xfrm>
-        <a:prstGeom prst="roundRect">
-          <a:avLst>
-            <a:gd name="adj" fmla="val 10000"/>
-          </a:avLst>
-        </a:prstGeom>
-        <a:solidFill>
-          <a:schemeClr val="accent1">
-            <a:hueOff val="0"/>
-            <a:satOff val="0"/>
-            <a:lumOff val="0"/>
-            <a:alphaOff val="0"/>
-          </a:schemeClr>
-        </a:solidFill>
-        <a:ln w="12700" cap="flat" cmpd="sng" algn="ctr">
-          <a:solidFill>
-            <a:schemeClr val="lt1">
-              <a:hueOff val="0"/>
-              <a:satOff val="0"/>
-              <a:lumOff val="0"/>
-              <a:alphaOff val="0"/>
-            </a:schemeClr>
-          </a:solidFill>
-          <a:prstDash val="solid"/>
-          <a:miter lim="800000"/>
-        </a:ln>
-        <a:effectLst/>
-      </dsp:spPr>
-      <dsp:style>
-        <a:lnRef idx="2">
-          <a:scrgbClr r="0" g="0" b="0"/>
-        </a:lnRef>
-        <a:fillRef idx="1">
-          <a:scrgbClr r="0" g="0" b="0"/>
-        </a:fillRef>
-        <a:effectRef idx="0">
-          <a:scrgbClr r="0" g="0" b="0"/>
-        </a:effectRef>
-        <a:fontRef idx="minor">
-          <a:schemeClr val="lt1"/>
-        </a:fontRef>
-      </dsp:style>
-      <dsp:txBody>
-        <a:bodyPr spcFirstLastPara="0" vert="horz" wrap="square" lIns="57150" tIns="57150" rIns="57150" bIns="57150" numCol="1" spcCol="1270" anchor="ctr" anchorCtr="0">
-          <a:noAutofit/>
-        </a:bodyPr>
-        <a:lstStyle/>
-        <a:p>
-          <a:pPr lvl="0" algn="ctr" defTabSz="666750">
-            <a:lnSpc>
-              <a:spcPct val="90000"/>
-            </a:lnSpc>
-            <a:spcBef>
-              <a:spcPct val="0"/>
-            </a:spcBef>
-            <a:spcAft>
-              <a:spcPct val="35000"/>
-            </a:spcAft>
-          </a:pPr>
-          <a:r>
-            <a:rPr lang="en-ZA" sz="1500" kern="1200" dirty="0" smtClean="0"/>
-            <a:t>Coding</a:t>
-          </a:r>
-        </a:p>
-      </dsp:txBody>
-      <dsp:txXfrm>
-        <a:off x="122420" y="2247458"/>
-        <a:ext cx="1903705" cy="463807"/>
-      </dsp:txXfrm>
-    </dsp:sp>
-    <dsp:sp modelId="{2354E252-F4A1-4619-87D5-32227FCB99F2}">
-      <dsp:nvSpPr>
-        <dsp:cNvPr id="0" name=""/>
-        <dsp:cNvSpPr/>
-      </dsp:nvSpPr>
-      <dsp:spPr>
-        <a:xfrm rot="5400000">
-          <a:off x="981898" y="2738012"/>
-          <a:ext cx="184750" cy="221700"/>
-        </a:xfrm>
-        <a:prstGeom prst="rightArrow">
-          <a:avLst>
-            <a:gd name="adj1" fmla="val 60000"/>
-            <a:gd name="adj2" fmla="val 50000"/>
-          </a:avLst>
-        </a:prstGeom>
-        <a:solidFill>
-          <a:schemeClr val="accent1">
-            <a:tint val="60000"/>
-            <a:hueOff val="0"/>
-            <a:satOff val="0"/>
-            <a:lumOff val="0"/>
-            <a:alphaOff val="0"/>
-          </a:schemeClr>
-        </a:solidFill>
-        <a:ln>
-          <a:noFill/>
-        </a:ln>
-        <a:effectLst/>
-      </dsp:spPr>
-      <dsp:style>
-        <a:lnRef idx="0">
-          <a:scrgbClr r="0" g="0" b="0"/>
-        </a:lnRef>
-        <a:fillRef idx="1">
-          <a:scrgbClr r="0" g="0" b="0"/>
-        </a:fillRef>
-        <a:effectRef idx="0">
-          <a:scrgbClr r="0" g="0" b="0"/>
-        </a:effectRef>
-        <a:fontRef idx="minor">
-          <a:schemeClr val="lt1"/>
-        </a:fontRef>
-      </dsp:style>
-      <dsp:txBody>
-        <a:bodyPr spcFirstLastPara="0" vert="horz" wrap="square" lIns="0" tIns="0" rIns="0" bIns="0" numCol="1" spcCol="1270" anchor="ctr" anchorCtr="0">
-          <a:noAutofit/>
-        </a:bodyPr>
-        <a:lstStyle/>
-        <a:p>
-          <a:pPr lvl="0" algn="ctr" defTabSz="355600">
-            <a:lnSpc>
-              <a:spcPct val="90000"/>
-            </a:lnSpc>
-            <a:spcBef>
-              <a:spcPct val="0"/>
-            </a:spcBef>
-            <a:spcAft>
-              <a:spcPct val="35000"/>
-            </a:spcAft>
-          </a:pPr>
-          <a:endParaRPr lang="en-ZA" sz="800" kern="1200"/>
-        </a:p>
-      </dsp:txBody>
-      <dsp:txXfrm rot="-5400000">
-        <a:off x="1007764" y="2756487"/>
-        <a:ext cx="133020" cy="129325"/>
-      </dsp:txXfrm>
-    </dsp:sp>
-    <dsp:sp modelId="{2AA5EB6B-6F84-481E-A18B-83054F65A1F2}">
-      <dsp:nvSpPr>
-        <dsp:cNvPr id="0" name=""/>
-        <dsp:cNvSpPr/>
-      </dsp:nvSpPr>
-      <dsp:spPr>
-        <a:xfrm>
-          <a:off x="107990" y="2972029"/>
-          <a:ext cx="1932565" cy="492667"/>
-        </a:xfrm>
-        <a:prstGeom prst="roundRect">
-          <a:avLst>
-            <a:gd name="adj" fmla="val 10000"/>
-          </a:avLst>
-        </a:prstGeom>
-        <a:solidFill>
-          <a:schemeClr val="accent1">
-            <a:hueOff val="0"/>
-            <a:satOff val="0"/>
-            <a:lumOff val="0"/>
-            <a:alphaOff val="0"/>
-          </a:schemeClr>
-        </a:solidFill>
-        <a:ln w="12700" cap="flat" cmpd="sng" algn="ctr">
-          <a:solidFill>
-            <a:schemeClr val="lt1">
-              <a:hueOff val="0"/>
-              <a:satOff val="0"/>
-              <a:lumOff val="0"/>
-              <a:alphaOff val="0"/>
-            </a:schemeClr>
-          </a:solidFill>
-          <a:prstDash val="solid"/>
-          <a:miter lim="800000"/>
-        </a:ln>
-        <a:effectLst/>
-      </dsp:spPr>
-      <dsp:style>
-        <a:lnRef idx="2">
-          <a:scrgbClr r="0" g="0" b="0"/>
-        </a:lnRef>
-        <a:fillRef idx="1">
-          <a:scrgbClr r="0" g="0" b="0"/>
-        </a:fillRef>
-        <a:effectRef idx="0">
-          <a:scrgbClr r="0" g="0" b="0"/>
-        </a:effectRef>
-        <a:fontRef idx="minor">
-          <a:schemeClr val="lt1"/>
-        </a:fontRef>
-      </dsp:style>
-      <dsp:txBody>
-        <a:bodyPr spcFirstLastPara="0" vert="horz" wrap="square" lIns="57150" tIns="57150" rIns="57150" bIns="57150" numCol="1" spcCol="1270" anchor="ctr" anchorCtr="0">
-          <a:noAutofit/>
-        </a:bodyPr>
-        <a:lstStyle/>
-        <a:p>
-          <a:pPr lvl="0" algn="ctr" defTabSz="666750">
-            <a:lnSpc>
-              <a:spcPct val="90000"/>
-            </a:lnSpc>
-            <a:spcBef>
-              <a:spcPct val="0"/>
-            </a:spcBef>
-            <a:spcAft>
-              <a:spcPct val="35000"/>
-            </a:spcAft>
-          </a:pPr>
-          <a:r>
-            <a:rPr lang="en-ZA" sz="1500" kern="1200" smtClean="0"/>
-            <a:t>Testing &amp; ATP</a:t>
-          </a:r>
-          <a:endParaRPr lang="en-ZA" sz="1500" kern="1200" dirty="0"/>
-        </a:p>
-      </dsp:txBody>
-      <dsp:txXfrm>
-        <a:off x="122420" y="2986459"/>
-        <a:ext cx="1903705" cy="463807"/>
-      </dsp:txXfrm>
-    </dsp:sp>
-    <dsp:sp modelId="{AD0CCC23-1F57-49C7-B76F-B4723BE73D69}">
-      <dsp:nvSpPr>
-        <dsp:cNvPr id="0" name=""/>
-        <dsp:cNvSpPr/>
-      </dsp:nvSpPr>
-      <dsp:spPr>
-        <a:xfrm rot="5400000">
-          <a:off x="1005189" y="3445959"/>
-          <a:ext cx="138169" cy="221700"/>
-        </a:xfrm>
-        <a:prstGeom prst="rightArrow">
-          <a:avLst>
-            <a:gd name="adj1" fmla="val 60000"/>
-            <a:gd name="adj2" fmla="val 50000"/>
-          </a:avLst>
-        </a:prstGeom>
-        <a:solidFill>
-          <a:schemeClr val="accent1">
-            <a:tint val="60000"/>
-            <a:hueOff val="0"/>
-            <a:satOff val="0"/>
-            <a:lumOff val="0"/>
-            <a:alphaOff val="0"/>
-          </a:schemeClr>
-        </a:solidFill>
-        <a:ln>
-          <a:noFill/>
-        </a:ln>
-        <a:effectLst/>
-      </dsp:spPr>
-      <dsp:style>
-        <a:lnRef idx="0">
-          <a:scrgbClr r="0" g="0" b="0"/>
-        </a:lnRef>
-        <a:fillRef idx="1">
-          <a:scrgbClr r="0" g="0" b="0"/>
-        </a:fillRef>
-        <a:effectRef idx="0">
-          <a:scrgbClr r="0" g="0" b="0"/>
-        </a:effectRef>
-        <a:fontRef idx="minor">
-          <a:schemeClr val="lt1"/>
-        </a:fontRef>
-      </dsp:style>
-      <dsp:txBody>
-        <a:bodyPr spcFirstLastPara="0" vert="horz" wrap="square" lIns="0" tIns="0" rIns="0" bIns="0" numCol="1" spcCol="1270" anchor="ctr" anchorCtr="0">
-          <a:noAutofit/>
-        </a:bodyPr>
-        <a:lstStyle/>
-        <a:p>
-          <a:pPr lvl="0" algn="ctr" defTabSz="266700">
-            <a:lnSpc>
-              <a:spcPct val="90000"/>
-            </a:lnSpc>
-            <a:spcBef>
-              <a:spcPct val="0"/>
-            </a:spcBef>
-            <a:spcAft>
-              <a:spcPct val="35000"/>
-            </a:spcAft>
-          </a:pPr>
-          <a:endParaRPr lang="en-ZA" sz="600" kern="1200"/>
-        </a:p>
-      </dsp:txBody>
-      <dsp:txXfrm rot="-5400000">
-        <a:off x="1007764" y="3487725"/>
-        <a:ext cx="133020" cy="96718"/>
-      </dsp:txXfrm>
-    </dsp:sp>
-    <dsp:sp modelId="{B0AFBA69-F6EE-4B41-94B1-52466432E21A}">
-      <dsp:nvSpPr>
-        <dsp:cNvPr id="0" name=""/>
-        <dsp:cNvSpPr/>
-      </dsp:nvSpPr>
-      <dsp:spPr>
-        <a:xfrm>
-          <a:off x="107990" y="3648922"/>
-          <a:ext cx="1932565" cy="492667"/>
-        </a:xfrm>
-        <a:prstGeom prst="roundRect">
-          <a:avLst>
-            <a:gd name="adj" fmla="val 10000"/>
-          </a:avLst>
-        </a:prstGeom>
-        <a:solidFill>
-          <a:schemeClr val="accent1">
-            <a:hueOff val="0"/>
-            <a:satOff val="0"/>
-            <a:lumOff val="0"/>
-            <a:alphaOff val="0"/>
-          </a:schemeClr>
-        </a:solidFill>
-        <a:ln w="12700" cap="flat" cmpd="sng" algn="ctr">
-          <a:solidFill>
-            <a:schemeClr val="lt1">
-              <a:hueOff val="0"/>
-              <a:satOff val="0"/>
-              <a:lumOff val="0"/>
-              <a:alphaOff val="0"/>
-            </a:schemeClr>
-          </a:solidFill>
-          <a:prstDash val="solid"/>
-          <a:miter lim="800000"/>
-        </a:ln>
-        <a:effectLst/>
-      </dsp:spPr>
-      <dsp:style>
-        <a:lnRef idx="2">
-          <a:scrgbClr r="0" g="0" b="0"/>
-        </a:lnRef>
-        <a:fillRef idx="1">
-          <a:scrgbClr r="0" g="0" b="0"/>
-        </a:fillRef>
-        <a:effectRef idx="0">
-          <a:scrgbClr r="0" g="0" b="0"/>
-        </a:effectRef>
-        <a:fontRef idx="minor">
-          <a:schemeClr val="lt1"/>
-        </a:fontRef>
-      </dsp:style>
-      <dsp:txBody>
-        <a:bodyPr spcFirstLastPara="0" vert="horz" wrap="square" lIns="57150" tIns="57150" rIns="57150" bIns="57150" numCol="1" spcCol="1270" anchor="ctr" anchorCtr="0">
-          <a:noAutofit/>
-        </a:bodyPr>
-        <a:lstStyle/>
-        <a:p>
-          <a:pPr lvl="0" algn="ctr" defTabSz="666750">
-            <a:lnSpc>
-              <a:spcPct val="90000"/>
-            </a:lnSpc>
-            <a:spcBef>
-              <a:spcPct val="0"/>
-            </a:spcBef>
-            <a:spcAft>
-              <a:spcPct val="35000"/>
-            </a:spcAft>
-          </a:pPr>
-          <a:r>
-            <a:rPr lang="en-ZA" sz="1500" kern="1200" dirty="0" smtClean="0"/>
-            <a:t>Final Documentation</a:t>
-          </a:r>
-          <a:endParaRPr lang="en-ZA" sz="1500" kern="1200" dirty="0"/>
-        </a:p>
-      </dsp:txBody>
-      <dsp:txXfrm>
-        <a:off x="122420" y="3663352"/>
-        <a:ext cx="1903705" cy="463807"/>
-      </dsp:txXfrm>
-    </dsp:sp>
   </dsp:spTree>
 </dsp:drawing>
 </file>
@@ -7846,8 +7022,8 @@
         </p:nvSpPr>
         <p:spPr bwMode="auto">
           <a:xfrm>
-            <a:off x="1259632" y="2420888"/>
-            <a:ext cx="6516798" cy="432048"/>
+            <a:off x="1259632" y="1628800"/>
+            <a:ext cx="6516798" cy="1512168"/>
           </a:xfrm>
           <a:prstGeom prst="rect">
             <a:avLst/>
@@ -7878,12 +7054,32 @@
           </a:lstStyle>
           <a:p>
             <a:pPr marL="571500" indent="-571500">
+              <a:lnSpc>
+                <a:spcPct val="200000"/>
+              </a:lnSpc>
               <a:buFont typeface="Arial" pitchFamily="34" charset="0"/>
               <a:buChar char="•"/>
             </a:pPr>
             <a:r>
+              <a:rPr lang="en-US" sz="2400" dirty="0" err="1" smtClean="0"/>
+              <a:t>DataExchangeFormat</a:t>
+            </a:r>
+            <a:r>
               <a:rPr lang="en-US" sz="2400" dirty="0" smtClean="0"/>
-              <a:t>David’s Slide</a:t>
+              <a:t> Interface</a:t>
+            </a:r>
+          </a:p>
+          <a:p>
+            <a:pPr marL="571500" indent="-571500">
+              <a:lnSpc>
+                <a:spcPct val="200000"/>
+              </a:lnSpc>
+              <a:buFont typeface="Arial" pitchFamily="34" charset="0"/>
+              <a:buChar char="•"/>
+            </a:pPr>
+            <a:r>
+              <a:rPr lang="en-US" sz="2400" dirty="0" smtClean="0"/>
+              <a:t>Database CRUD</a:t>
             </a:r>
             <a:endParaRPr lang="en-US" sz="2400" dirty="0"/>
           </a:p>
@@ -8355,18 +7551,7 @@
                 <a:ea typeface="+mj-ea"/>
                 <a:cs typeface="+mj-cs"/>
               </a:rPr>
-              <a:t>Invites – 3 Stages for </a:t>
-            </a:r>
-            <a:r>
-              <a:rPr lang="en-US" sz="2400" b="1" dirty="0" smtClean="0">
-                <a:solidFill>
-                  <a:schemeClr val="accent1"/>
-                </a:solidFill>
-                <a:latin typeface="+mj-lt"/>
-                <a:ea typeface="+mj-ea"/>
-                <a:cs typeface="+mj-cs"/>
-              </a:rPr>
-              <a:t>AES256</a:t>
+              <a:t>Invites – 3 Stages for AES256</a:t>
             </a:r>
           </a:p>
           <a:p>
@@ -9131,7 +8316,6 @@
               <a:rPr lang="en-ZA" dirty="0" smtClean="0"/>
               <a:t>Finishing up</a:t>
             </a:r>
-            <a:endParaRPr lang="en-ZA" dirty="0" smtClean="0"/>
           </a:p>
         </p:txBody>
       </p:sp>

</xml_diff>